<commit_message>
update ds final project
</commit_message>
<xml_diff>
--- a/proj/final_project_group_30.pptx
+++ b/proj/final_project_group_30.pptx
@@ -6,6 +6,8 @@
   </p:sldMasterIdLst>
   <p:sldIdLst>
     <p:sldId id="256" r:id="rId2"/>
+    <p:sldId id="257" r:id="rId3"/>
+    <p:sldId id="258" r:id="rId4"/>
   </p:sldIdLst>
   <p:sldSz cx="12192000" cy="6858000"/>
   <p:notesSz cx="6858000" cy="9144000"/>
@@ -104,6 +106,11 @@
       </a:defRPr>
     </a:lvl9pPr>
   </p:defaultTextStyle>
+  <p:extLst>
+    <p:ext uri="{EFAFB233-063F-42B5-8137-9DF3F51BA10A}">
+      <p15:sldGuideLst xmlns:p15="http://schemas.microsoft.com/office/powerpoint/2012/main"/>
+    </p:ext>
+  </p:extLst>
 </p:presentation>
 </file>
 
@@ -258,7 +265,7 @@
           <a:p>
             <a:fld id="{A5EF0C65-400F-4E19-8F67-8A5070C608EB}" type="datetimeFigureOut">
               <a:rPr lang="en-US" smtClean="0"/>
-              <a:t>11/13/2017</a:t>
+              <a:t>11/26/2017</a:t>
             </a:fld>
             <a:endParaRPr lang="en-US"/>
           </a:p>
@@ -456,7 +463,7 @@
           <a:p>
             <a:fld id="{A5EF0C65-400F-4E19-8F67-8A5070C608EB}" type="datetimeFigureOut">
               <a:rPr lang="en-US" smtClean="0"/>
-              <a:t>11/13/2017</a:t>
+              <a:t>11/26/2017</a:t>
             </a:fld>
             <a:endParaRPr lang="en-US"/>
           </a:p>
@@ -664,7 +671,7 @@
           <a:p>
             <a:fld id="{A5EF0C65-400F-4E19-8F67-8A5070C608EB}" type="datetimeFigureOut">
               <a:rPr lang="en-US" smtClean="0"/>
-              <a:t>11/13/2017</a:t>
+              <a:t>11/26/2017</a:t>
             </a:fld>
             <a:endParaRPr lang="en-US"/>
           </a:p>
@@ -862,7 +869,7 @@
           <a:p>
             <a:fld id="{A5EF0C65-400F-4E19-8F67-8A5070C608EB}" type="datetimeFigureOut">
               <a:rPr lang="en-US" smtClean="0"/>
-              <a:t>11/13/2017</a:t>
+              <a:t>11/26/2017</a:t>
             </a:fld>
             <a:endParaRPr lang="en-US"/>
           </a:p>
@@ -1137,7 +1144,7 @@
           <a:p>
             <a:fld id="{A5EF0C65-400F-4E19-8F67-8A5070C608EB}" type="datetimeFigureOut">
               <a:rPr lang="en-US" smtClean="0"/>
-              <a:t>11/13/2017</a:t>
+              <a:t>11/26/2017</a:t>
             </a:fld>
             <a:endParaRPr lang="en-US"/>
           </a:p>
@@ -1402,7 +1409,7 @@
           <a:p>
             <a:fld id="{A5EF0C65-400F-4E19-8F67-8A5070C608EB}" type="datetimeFigureOut">
               <a:rPr lang="en-US" smtClean="0"/>
-              <a:t>11/13/2017</a:t>
+              <a:t>11/26/2017</a:t>
             </a:fld>
             <a:endParaRPr lang="en-US"/>
           </a:p>
@@ -1814,7 +1821,7 @@
           <a:p>
             <a:fld id="{A5EF0C65-400F-4E19-8F67-8A5070C608EB}" type="datetimeFigureOut">
               <a:rPr lang="en-US" smtClean="0"/>
-              <a:t>11/13/2017</a:t>
+              <a:t>11/26/2017</a:t>
             </a:fld>
             <a:endParaRPr lang="en-US"/>
           </a:p>
@@ -1955,7 +1962,7 @@
           <a:p>
             <a:fld id="{A5EF0C65-400F-4E19-8F67-8A5070C608EB}" type="datetimeFigureOut">
               <a:rPr lang="en-US" smtClean="0"/>
-              <a:t>11/13/2017</a:t>
+              <a:t>11/26/2017</a:t>
             </a:fld>
             <a:endParaRPr lang="en-US"/>
           </a:p>
@@ -2068,7 +2075,7 @@
           <a:p>
             <a:fld id="{A5EF0C65-400F-4E19-8F67-8A5070C608EB}" type="datetimeFigureOut">
               <a:rPr lang="en-US" smtClean="0"/>
-              <a:t>11/13/2017</a:t>
+              <a:t>11/26/2017</a:t>
             </a:fld>
             <a:endParaRPr lang="en-US"/>
           </a:p>
@@ -2379,7 +2386,7 @@
           <a:p>
             <a:fld id="{A5EF0C65-400F-4E19-8F67-8A5070C608EB}" type="datetimeFigureOut">
               <a:rPr lang="en-US" smtClean="0"/>
-              <a:t>11/13/2017</a:t>
+              <a:t>11/26/2017</a:t>
             </a:fld>
             <a:endParaRPr lang="en-US"/>
           </a:p>
@@ -2667,7 +2674,7 @@
           <a:p>
             <a:fld id="{A5EF0C65-400F-4E19-8F67-8A5070C608EB}" type="datetimeFigureOut">
               <a:rPr lang="en-US" smtClean="0"/>
-              <a:t>11/13/2017</a:t>
+              <a:t>11/26/2017</a:t>
             </a:fld>
             <a:endParaRPr lang="en-US"/>
           </a:p>
@@ -2908,7 +2915,7 @@
           <a:p>
             <a:fld id="{A5EF0C65-400F-4E19-8F67-8A5070C608EB}" type="datetimeFigureOut">
               <a:rPr lang="en-US" smtClean="0"/>
-              <a:t>11/13/2017</a:t>
+              <a:t>11/26/2017</a:t>
             </a:fld>
             <a:endParaRPr lang="en-US"/>
           </a:p>
@@ -3606,6 +3613,66 @@
 </p:sld>
 </file>
 
+<file path=ppt/slides/slide2.xml><?xml version="1.0" encoding="utf-8"?>
+<p:sld xmlns:a="http://schemas.openxmlformats.org/drawingml/2006/main" xmlns:r="http://schemas.openxmlformats.org/officeDocument/2006/relationships" xmlns:p="http://schemas.openxmlformats.org/presentationml/2006/main">
+  <p:cSld>
+    <p:spTree>
+      <p:nvGrpSpPr>
+        <p:cNvPr id="1" name=""/>
+        <p:cNvGrpSpPr/>
+        <p:nvPr/>
+      </p:nvGrpSpPr>
+      <p:grpSpPr>
+        <a:xfrm>
+          <a:off x="0" y="0"/>
+          <a:ext cx="0" cy="0"/>
+          <a:chOff x="0" y="0"/>
+          <a:chExt cx="0" cy="0"/>
+        </a:xfrm>
+      </p:grpSpPr>
+    </p:spTree>
+    <p:extLst>
+      <p:ext uri="{BB962C8B-B14F-4D97-AF65-F5344CB8AC3E}">
+        <p14:creationId xmlns:p14="http://schemas.microsoft.com/office/powerpoint/2010/main" val="657576241"/>
+      </p:ext>
+    </p:extLst>
+  </p:cSld>
+  <p:clrMapOvr>
+    <a:masterClrMapping/>
+  </p:clrMapOvr>
+</p:sld>
+</file>
+
+<file path=ppt/slides/slide3.xml><?xml version="1.0" encoding="utf-8"?>
+<p:sld xmlns:a="http://schemas.openxmlformats.org/drawingml/2006/main" xmlns:r="http://schemas.openxmlformats.org/officeDocument/2006/relationships" xmlns:p="http://schemas.openxmlformats.org/presentationml/2006/main">
+  <p:cSld>
+    <p:spTree>
+      <p:nvGrpSpPr>
+        <p:cNvPr id="1" name=""/>
+        <p:cNvGrpSpPr/>
+        <p:nvPr/>
+      </p:nvGrpSpPr>
+      <p:grpSpPr>
+        <a:xfrm>
+          <a:off x="0" y="0"/>
+          <a:ext cx="0" cy="0"/>
+          <a:chOff x="0" y="0"/>
+          <a:chExt cx="0" cy="0"/>
+        </a:xfrm>
+      </p:grpSpPr>
+    </p:spTree>
+    <p:extLst>
+      <p:ext uri="{BB962C8B-B14F-4D97-AF65-F5344CB8AC3E}">
+        <p14:creationId xmlns:p14="http://schemas.microsoft.com/office/powerpoint/2010/main" val="1929226195"/>
+      </p:ext>
+    </p:extLst>
+  </p:cSld>
+  <p:clrMapOvr>
+    <a:masterClrMapping/>
+  </p:clrMapOvr>
+</p:sld>
+</file>
+
 <file path=ppt/theme/theme1.xml><?xml version="1.0" encoding="utf-8"?>
 <a:theme xmlns:a="http://schemas.openxmlformats.org/drawingml/2006/main" name="Office Theme">
   <a:themeElements>

</xml_diff>

<commit_message>
data mining project done
</commit_message>
<xml_diff>
--- a/proj/final_project_group_30.pptx
+++ b/proj/final_project_group_30.pptx
@@ -8,6 +8,10 @@
     <p:sldId id="256" r:id="rId2"/>
     <p:sldId id="257" r:id="rId3"/>
     <p:sldId id="258" r:id="rId4"/>
+    <p:sldId id="259" r:id="rId5"/>
+    <p:sldId id="260" r:id="rId6"/>
+    <p:sldId id="261" r:id="rId7"/>
+    <p:sldId id="262" r:id="rId8"/>
   </p:sldIdLst>
   <p:sldSz cx="12192000" cy="6858000"/>
   <p:notesSz cx="6858000" cy="9144000"/>
@@ -265,7 +269,7 @@
           <a:p>
             <a:fld id="{A5EF0C65-400F-4E19-8F67-8A5070C608EB}" type="datetimeFigureOut">
               <a:rPr lang="en-US" smtClean="0"/>
-              <a:t>11/26/2017</a:t>
+              <a:t>11/28/2017</a:t>
             </a:fld>
             <a:endParaRPr lang="en-US"/>
           </a:p>
@@ -463,7 +467,7 @@
           <a:p>
             <a:fld id="{A5EF0C65-400F-4E19-8F67-8A5070C608EB}" type="datetimeFigureOut">
               <a:rPr lang="en-US" smtClean="0"/>
-              <a:t>11/26/2017</a:t>
+              <a:t>11/28/2017</a:t>
             </a:fld>
             <a:endParaRPr lang="en-US"/>
           </a:p>
@@ -671,7 +675,7 @@
           <a:p>
             <a:fld id="{A5EF0C65-400F-4E19-8F67-8A5070C608EB}" type="datetimeFigureOut">
               <a:rPr lang="en-US" smtClean="0"/>
-              <a:t>11/26/2017</a:t>
+              <a:t>11/28/2017</a:t>
             </a:fld>
             <a:endParaRPr lang="en-US"/>
           </a:p>
@@ -869,7 +873,7 @@
           <a:p>
             <a:fld id="{A5EF0C65-400F-4E19-8F67-8A5070C608EB}" type="datetimeFigureOut">
               <a:rPr lang="en-US" smtClean="0"/>
-              <a:t>11/26/2017</a:t>
+              <a:t>11/28/2017</a:t>
             </a:fld>
             <a:endParaRPr lang="en-US"/>
           </a:p>
@@ -1144,7 +1148,7 @@
           <a:p>
             <a:fld id="{A5EF0C65-400F-4E19-8F67-8A5070C608EB}" type="datetimeFigureOut">
               <a:rPr lang="en-US" smtClean="0"/>
-              <a:t>11/26/2017</a:t>
+              <a:t>11/28/2017</a:t>
             </a:fld>
             <a:endParaRPr lang="en-US"/>
           </a:p>
@@ -1409,7 +1413,7 @@
           <a:p>
             <a:fld id="{A5EF0C65-400F-4E19-8F67-8A5070C608EB}" type="datetimeFigureOut">
               <a:rPr lang="en-US" smtClean="0"/>
-              <a:t>11/26/2017</a:t>
+              <a:t>11/28/2017</a:t>
             </a:fld>
             <a:endParaRPr lang="en-US"/>
           </a:p>
@@ -1821,7 +1825,7 @@
           <a:p>
             <a:fld id="{A5EF0C65-400F-4E19-8F67-8A5070C608EB}" type="datetimeFigureOut">
               <a:rPr lang="en-US" smtClean="0"/>
-              <a:t>11/26/2017</a:t>
+              <a:t>11/28/2017</a:t>
             </a:fld>
             <a:endParaRPr lang="en-US"/>
           </a:p>
@@ -1962,7 +1966,7 @@
           <a:p>
             <a:fld id="{A5EF0C65-400F-4E19-8F67-8A5070C608EB}" type="datetimeFigureOut">
               <a:rPr lang="en-US" smtClean="0"/>
-              <a:t>11/26/2017</a:t>
+              <a:t>11/28/2017</a:t>
             </a:fld>
             <a:endParaRPr lang="en-US"/>
           </a:p>
@@ -2075,7 +2079,7 @@
           <a:p>
             <a:fld id="{A5EF0C65-400F-4E19-8F67-8A5070C608EB}" type="datetimeFigureOut">
               <a:rPr lang="en-US" smtClean="0"/>
-              <a:t>11/26/2017</a:t>
+              <a:t>11/28/2017</a:t>
             </a:fld>
             <a:endParaRPr lang="en-US"/>
           </a:p>
@@ -2386,7 +2390,7 @@
           <a:p>
             <a:fld id="{A5EF0C65-400F-4E19-8F67-8A5070C608EB}" type="datetimeFigureOut">
               <a:rPr lang="en-US" smtClean="0"/>
-              <a:t>11/26/2017</a:t>
+              <a:t>11/28/2017</a:t>
             </a:fld>
             <a:endParaRPr lang="en-US"/>
           </a:p>
@@ -2674,7 +2678,7 @@
           <a:p>
             <a:fld id="{A5EF0C65-400F-4E19-8F67-8A5070C608EB}" type="datetimeFigureOut">
               <a:rPr lang="en-US" smtClean="0"/>
-              <a:t>11/26/2017</a:t>
+              <a:t>11/28/2017</a:t>
             </a:fld>
             <a:endParaRPr lang="en-US"/>
           </a:p>
@@ -2915,7 +2919,7 @@
           <a:p>
             <a:fld id="{A5EF0C65-400F-4E19-8F67-8A5070C608EB}" type="datetimeFigureOut">
               <a:rPr lang="en-US" smtClean="0"/>
-              <a:t>11/26/2017</a:t>
+              <a:t>11/28/2017</a:t>
             </a:fld>
             <a:endParaRPr lang="en-US"/>
           </a:p>
@@ -3358,8 +3362,8 @@
         </p:blipFill>
         <p:spPr>
           <a:xfrm>
-            <a:off x="5894119" y="244100"/>
-            <a:ext cx="5957455" cy="3604697"/>
+            <a:off x="6434446" y="178881"/>
+            <a:ext cx="5078681" cy="3184900"/>
           </a:xfrm>
           <a:prstGeom prst="rect">
             <a:avLst/>
@@ -3455,7 +3459,7 @@
         </p:nvSpPr>
         <p:spPr>
           <a:xfrm>
-            <a:off x="511233" y="4198700"/>
+            <a:off x="594360" y="3994062"/>
             <a:ext cx="5584767" cy="2185214"/>
           </a:xfrm>
           <a:prstGeom prst="rect">
@@ -3548,8 +3552,8 @@
         </p:nvSpPr>
         <p:spPr>
           <a:xfrm>
-            <a:off x="6096000" y="4195938"/>
-            <a:ext cx="5755574" cy="2185214"/>
+            <a:off x="6096000" y="3720925"/>
+            <a:ext cx="5755574" cy="3293209"/>
           </a:xfrm>
           <a:prstGeom prst="rect">
             <a:avLst/>
@@ -3574,7 +3578,15 @@
             </a:pPr>
             <a:r>
               <a:rPr lang="en-US" dirty="0"/>
-              <a:t>Data preprocessing and integration will be performed using Scala with Spark</a:t>
+              <a:t>Data preprocessing and integration will be performed using Scala with Spark </a:t>
+            </a:r>
+            <a:r>
+              <a:rPr lang="en-US" dirty="0">
+                <a:solidFill>
+                  <a:srgbClr val="FF0000"/>
+                </a:solidFill>
+              </a:rPr>
+              <a:t>(DONE)</a:t>
             </a:r>
           </a:p>
           <a:p>
@@ -3592,7 +3604,37 @@
             </a:r>
             <a:r>
               <a:rPr lang="en-US" dirty="0"/>
-              <a:t>-learn</a:t>
+              <a:t>-learn </a:t>
+            </a:r>
+          </a:p>
+          <a:p>
+            <a:pPr marL="285750" indent="-285750">
+              <a:buFont typeface="Arial" panose="020B0604020202020204" pitchFamily="34" charset="0"/>
+              <a:buChar char="•"/>
+            </a:pPr>
+            <a:r>
+              <a:rPr lang="en-US" dirty="0">
+                <a:solidFill>
+                  <a:srgbClr val="FF0000"/>
+                </a:solidFill>
+              </a:rPr>
+              <a:t>Challenge: need to integrate several heterogenous data together since the unemployment data, GDP, income, location data are from different sources with different format (~ 500 lines of </a:t>
+            </a:r>
+            <a:r>
+              <a:rPr lang="en-US" dirty="0" err="1">
+                <a:solidFill>
+                  <a:srgbClr val="FF0000"/>
+                </a:solidFill>
+              </a:rPr>
+              <a:t>scala</a:t>
+            </a:r>
+            <a:r>
+              <a:rPr lang="en-US" dirty="0">
+                <a:solidFill>
+                  <a:srgbClr val="FF0000"/>
+                </a:solidFill>
+              </a:rPr>
+              <a:t> code)</a:t>
             </a:r>
           </a:p>
           <a:p>
@@ -3630,6 +3672,160 @@
           <a:chExt cx="0" cy="0"/>
         </a:xfrm>
       </p:grpSpPr>
+      <p:pic>
+        <p:nvPicPr>
+          <p:cNvPr id="3" name="Picture 2">
+            <a:extLst>
+              <a:ext uri="{FF2B5EF4-FFF2-40B4-BE49-F238E27FC236}">
+                <a16:creationId xmlns:a16="http://schemas.microsoft.com/office/drawing/2014/main" id="{AAE93C03-9506-4DAC-9B03-264CD8693D41}"/>
+              </a:ext>
+            </a:extLst>
+          </p:cNvPr>
+          <p:cNvPicPr>
+            <a:picLocks noChangeAspect="1"/>
+          </p:cNvPicPr>
+          <p:nvPr/>
+        </p:nvPicPr>
+        <p:blipFill>
+          <a:blip r:embed="rId2">
+            <a:extLst>
+              <a:ext uri="{28A0092B-C50C-407E-A947-70E740481C1C}">
+                <a14:useLocalDpi xmlns:a14="http://schemas.microsoft.com/office/drawing/2010/main" val="0"/>
+              </a:ext>
+            </a:extLst>
+          </a:blip>
+          <a:stretch>
+            <a:fillRect/>
+          </a:stretch>
+        </p:blipFill>
+        <p:spPr>
+          <a:xfrm>
+            <a:off x="4236720" y="683762"/>
+            <a:ext cx="7728168" cy="5796126"/>
+          </a:xfrm>
+          <a:prstGeom prst="rect">
+            <a:avLst/>
+          </a:prstGeom>
+        </p:spPr>
+      </p:pic>
+      <p:sp>
+        <p:nvSpPr>
+          <p:cNvPr id="4" name="TextBox 3">
+            <a:extLst>
+              <a:ext uri="{FF2B5EF4-FFF2-40B4-BE49-F238E27FC236}">
+                <a16:creationId xmlns:a16="http://schemas.microsoft.com/office/drawing/2014/main" id="{28F4BD19-4B8A-4564-8CBC-9A2590971F79}"/>
+              </a:ext>
+            </a:extLst>
+          </p:cNvPr>
+          <p:cNvSpPr txBox="1"/>
+          <p:nvPr/>
+        </p:nvSpPr>
+        <p:spPr>
+          <a:xfrm>
+            <a:off x="227112" y="576232"/>
+            <a:ext cx="9239774" cy="5262979"/>
+          </a:xfrm>
+          <a:prstGeom prst="rect">
+            <a:avLst/>
+          </a:prstGeom>
+          <a:noFill/>
+        </p:spPr>
+        <p:txBody>
+          <a:bodyPr wrap="none" rtlCol="0">
+            <a:spAutoFit/>
+          </a:bodyPr>
+          <a:lstStyle/>
+          <a:p>
+            <a:pPr marL="285750" indent="-285750">
+              <a:buFont typeface="Arial" panose="020B0604020202020204" pitchFamily="34" charset="0"/>
+              <a:buChar char="•"/>
+            </a:pPr>
+            <a:r>
+              <a:rPr lang="en-US" sz="2800" dirty="0"/>
+              <a:t>Unemployment rate 2015 county based (&gt; 400k data points)</a:t>
+            </a:r>
+          </a:p>
+          <a:p>
+            <a:pPr marL="285750" indent="-285750">
+              <a:buFont typeface="Arial" panose="020B0604020202020204" pitchFamily="34" charset="0"/>
+              <a:buChar char="•"/>
+            </a:pPr>
+            <a:r>
+              <a:rPr lang="en-US" sz="2800" dirty="0"/>
+              <a:t>Blue -&gt; low rate (&lt;= 4%)</a:t>
+            </a:r>
+          </a:p>
+          <a:p>
+            <a:pPr marL="285750" indent="-285750">
+              <a:buFont typeface="Arial" panose="020B0604020202020204" pitchFamily="34" charset="0"/>
+              <a:buChar char="•"/>
+            </a:pPr>
+            <a:r>
+              <a:rPr lang="en-US" sz="2800" dirty="0"/>
+              <a:t>Red -&gt; high rate (&gt;= 8%)</a:t>
+            </a:r>
+          </a:p>
+          <a:p>
+            <a:pPr marL="285750" indent="-285750">
+              <a:buFont typeface="Arial" panose="020B0604020202020204" pitchFamily="34" charset="0"/>
+              <a:buChar char="•"/>
+            </a:pPr>
+            <a:endParaRPr lang="en-US" sz="2800" dirty="0"/>
+          </a:p>
+          <a:p>
+            <a:pPr marL="285750" indent="-285750">
+              <a:buFont typeface="Arial" panose="020B0604020202020204" pitchFamily="34" charset="0"/>
+              <a:buChar char="•"/>
+            </a:pPr>
+            <a:endParaRPr lang="en-US" sz="2800" dirty="0"/>
+          </a:p>
+          <a:p>
+            <a:pPr marL="285750" indent="-285750">
+              <a:buFont typeface="Arial" panose="020B0604020202020204" pitchFamily="34" charset="0"/>
+              <a:buChar char="•"/>
+            </a:pPr>
+            <a:endParaRPr lang="en-US" sz="2800" dirty="0"/>
+          </a:p>
+          <a:p>
+            <a:pPr marL="285750" indent="-285750">
+              <a:buFont typeface="Arial" panose="020B0604020202020204" pitchFamily="34" charset="0"/>
+              <a:buChar char="•"/>
+            </a:pPr>
+            <a:endParaRPr lang="en-US" sz="2800" dirty="0"/>
+          </a:p>
+          <a:p>
+            <a:pPr marL="285750" indent="-285750">
+              <a:buFont typeface="Arial" panose="020B0604020202020204" pitchFamily="34" charset="0"/>
+              <a:buChar char="•"/>
+            </a:pPr>
+            <a:endParaRPr lang="en-US" sz="2800" dirty="0"/>
+          </a:p>
+          <a:p>
+            <a:r>
+              <a:rPr lang="en-US" sz="2800" dirty="0"/>
+              <a:t>Problem:</a:t>
+            </a:r>
+          </a:p>
+          <a:p>
+            <a:r>
+              <a:rPr lang="en-US" sz="2800" dirty="0"/>
+              <a:t>	No GDP data available for </a:t>
+            </a:r>
+          </a:p>
+          <a:p>
+            <a:r>
+              <a:rPr lang="en-US" sz="2800" dirty="0"/>
+              <a:t>counties; only metro data </a:t>
+            </a:r>
+          </a:p>
+          <a:p>
+            <a:r>
+              <a:rPr lang="en-US" sz="2800" dirty="0"/>
+              <a:t>available </a:t>
+            </a:r>
+          </a:p>
+        </p:txBody>
+      </p:sp>
     </p:spTree>
     <p:extLst>
       <p:ext uri="{BB962C8B-B14F-4D97-AF65-F5344CB8AC3E}">
@@ -3660,10 +3856,1049 @@
           <a:chExt cx="0" cy="0"/>
         </a:xfrm>
       </p:grpSpPr>
+      <p:pic>
+        <p:nvPicPr>
+          <p:cNvPr id="3" name="Picture 2">
+            <a:extLst>
+              <a:ext uri="{FF2B5EF4-FFF2-40B4-BE49-F238E27FC236}">
+                <a16:creationId xmlns:a16="http://schemas.microsoft.com/office/drawing/2014/main" id="{88416EF3-A946-4C61-9AAF-903470874C74}"/>
+              </a:ext>
+            </a:extLst>
+          </p:cNvPr>
+          <p:cNvPicPr>
+            <a:picLocks noChangeAspect="1"/>
+          </p:cNvPicPr>
+          <p:nvPr/>
+        </p:nvPicPr>
+        <p:blipFill>
+          <a:blip r:embed="rId2">
+            <a:extLst>
+              <a:ext uri="{28A0092B-C50C-407E-A947-70E740481C1C}">
+                <a14:useLocalDpi xmlns:a14="http://schemas.microsoft.com/office/drawing/2010/main" val="0"/>
+              </a:ext>
+            </a:extLst>
+          </a:blip>
+          <a:stretch>
+            <a:fillRect/>
+          </a:stretch>
+        </p:blipFill>
+        <p:spPr>
+          <a:xfrm>
+            <a:off x="6959600" y="57150"/>
+            <a:ext cx="4495800" cy="3371850"/>
+          </a:xfrm>
+          <a:prstGeom prst="rect">
+            <a:avLst/>
+          </a:prstGeom>
+        </p:spPr>
+      </p:pic>
+      <p:pic>
+        <p:nvPicPr>
+          <p:cNvPr id="5" name="Picture 4">
+            <a:extLst>
+              <a:ext uri="{FF2B5EF4-FFF2-40B4-BE49-F238E27FC236}">
+                <a16:creationId xmlns:a16="http://schemas.microsoft.com/office/drawing/2014/main" id="{A5B06D7A-30FE-45D4-89AC-D61A572F1574}"/>
+              </a:ext>
+            </a:extLst>
+          </p:cNvPr>
+          <p:cNvPicPr>
+            <a:picLocks noChangeAspect="1"/>
+          </p:cNvPicPr>
+          <p:nvPr/>
+        </p:nvPicPr>
+        <p:blipFill>
+          <a:blip r:embed="rId3">
+            <a:extLst>
+              <a:ext uri="{28A0092B-C50C-407E-A947-70E740481C1C}">
+                <a14:useLocalDpi xmlns:a14="http://schemas.microsoft.com/office/drawing/2010/main" val="0"/>
+              </a:ext>
+            </a:extLst>
+          </a:blip>
+          <a:stretch>
+            <a:fillRect/>
+          </a:stretch>
+        </p:blipFill>
+        <p:spPr>
+          <a:xfrm>
+            <a:off x="350520" y="2674620"/>
+            <a:ext cx="5577840" cy="4183380"/>
+          </a:xfrm>
+          <a:prstGeom prst="rect">
+            <a:avLst/>
+          </a:prstGeom>
+        </p:spPr>
+      </p:pic>
+      <p:pic>
+        <p:nvPicPr>
+          <p:cNvPr id="7" name="Picture 6">
+            <a:extLst>
+              <a:ext uri="{FF2B5EF4-FFF2-40B4-BE49-F238E27FC236}">
+                <a16:creationId xmlns:a16="http://schemas.microsoft.com/office/drawing/2014/main" id="{F9178C10-EF90-4106-8E3A-52EDC397D5AD}"/>
+              </a:ext>
+            </a:extLst>
+          </p:cNvPr>
+          <p:cNvPicPr>
+            <a:picLocks noChangeAspect="1"/>
+          </p:cNvPicPr>
+          <p:nvPr/>
+        </p:nvPicPr>
+        <p:blipFill>
+          <a:blip r:embed="rId4">
+            <a:extLst>
+              <a:ext uri="{28A0092B-C50C-407E-A947-70E740481C1C}">
+                <a14:useLocalDpi xmlns:a14="http://schemas.microsoft.com/office/drawing/2010/main" val="0"/>
+              </a:ext>
+            </a:extLst>
+          </a:blip>
+          <a:stretch>
+            <a:fillRect/>
+          </a:stretch>
+        </p:blipFill>
+        <p:spPr>
+          <a:xfrm>
+            <a:off x="6842760" y="3133725"/>
+            <a:ext cx="4729480" cy="3547110"/>
+          </a:xfrm>
+          <a:prstGeom prst="rect">
+            <a:avLst/>
+          </a:prstGeom>
+        </p:spPr>
+      </p:pic>
+      <p:sp>
+        <p:nvSpPr>
+          <p:cNvPr id="8" name="Rectangle 7">
+            <a:extLst>
+              <a:ext uri="{FF2B5EF4-FFF2-40B4-BE49-F238E27FC236}">
+                <a16:creationId xmlns:a16="http://schemas.microsoft.com/office/drawing/2014/main" id="{83C2376D-4F21-4A1B-BC49-A2A67EA8C83F}"/>
+              </a:ext>
+            </a:extLst>
+          </p:cNvPr>
+          <p:cNvSpPr/>
+          <p:nvPr/>
+        </p:nvSpPr>
+        <p:spPr>
+          <a:xfrm>
+            <a:off x="8595794" y="295386"/>
+            <a:ext cx="1223412" cy="707886"/>
+          </a:xfrm>
+          <a:prstGeom prst="rect">
+            <a:avLst/>
+          </a:prstGeom>
+          <a:noFill/>
+        </p:spPr>
+        <p:txBody>
+          <a:bodyPr wrap="none" lIns="91440" tIns="45720" rIns="91440" bIns="45720">
+            <a:spAutoFit/>
+          </a:bodyPr>
+          <a:lstStyle/>
+          <a:p>
+            <a:pPr algn="ctr"/>
+            <a:r>
+              <a:rPr lang="en-US" sz="4000" b="0" cap="none" spc="0" dirty="0">
+                <a:ln w="0"/>
+                <a:solidFill>
+                  <a:schemeClr val="tx1"/>
+                </a:solidFill>
+                <a:effectLst>
+                  <a:outerShdw blurRad="38100" dist="19050" dir="2700000" algn="tl" rotWithShape="0">
+                    <a:schemeClr val="dk1">
+                      <a:alpha val="40000"/>
+                    </a:schemeClr>
+                  </a:outerShdw>
+                </a:effectLst>
+              </a:rPr>
+              <a:t>2006</a:t>
+            </a:r>
+          </a:p>
+        </p:txBody>
+      </p:sp>
+      <p:sp>
+        <p:nvSpPr>
+          <p:cNvPr id="11" name="Rectangle 10">
+            <a:extLst>
+              <a:ext uri="{FF2B5EF4-FFF2-40B4-BE49-F238E27FC236}">
+                <a16:creationId xmlns:a16="http://schemas.microsoft.com/office/drawing/2014/main" id="{AC86D2E4-5DD1-420D-8475-C4E84C3579F6}"/>
+              </a:ext>
+            </a:extLst>
+          </p:cNvPr>
+          <p:cNvSpPr/>
+          <p:nvPr/>
+        </p:nvSpPr>
+        <p:spPr>
+          <a:xfrm>
+            <a:off x="3845665" y="3144240"/>
+            <a:ext cx="1223412" cy="707886"/>
+          </a:xfrm>
+          <a:prstGeom prst="rect">
+            <a:avLst/>
+          </a:prstGeom>
+          <a:noFill/>
+        </p:spPr>
+        <p:txBody>
+          <a:bodyPr wrap="none" lIns="91440" tIns="45720" rIns="91440" bIns="45720">
+            <a:spAutoFit/>
+          </a:bodyPr>
+          <a:lstStyle/>
+          <a:p>
+            <a:pPr algn="ctr"/>
+            <a:r>
+              <a:rPr lang="en-US" sz="4000" b="0" cap="none" spc="0" dirty="0">
+                <a:ln w="0"/>
+                <a:solidFill>
+                  <a:schemeClr val="tx1"/>
+                </a:solidFill>
+                <a:effectLst>
+                  <a:outerShdw blurRad="38100" dist="19050" dir="2700000" algn="tl" rotWithShape="0">
+                    <a:schemeClr val="dk1">
+                      <a:alpha val="40000"/>
+                    </a:schemeClr>
+                  </a:outerShdw>
+                </a:effectLst>
+              </a:rPr>
+              <a:t>2009</a:t>
+            </a:r>
+          </a:p>
+        </p:txBody>
+      </p:sp>
+      <p:sp>
+        <p:nvSpPr>
+          <p:cNvPr id="12" name="Rectangle 11">
+            <a:extLst>
+              <a:ext uri="{FF2B5EF4-FFF2-40B4-BE49-F238E27FC236}">
+                <a16:creationId xmlns:a16="http://schemas.microsoft.com/office/drawing/2014/main" id="{0068E39E-6FC7-4F8A-8B4C-0DD76FE88602}"/>
+              </a:ext>
+            </a:extLst>
+          </p:cNvPr>
+          <p:cNvSpPr/>
+          <p:nvPr/>
+        </p:nvSpPr>
+        <p:spPr>
+          <a:xfrm>
+            <a:off x="7441820" y="5401912"/>
+            <a:ext cx="1223412" cy="707886"/>
+          </a:xfrm>
+          <a:prstGeom prst="rect">
+            <a:avLst/>
+          </a:prstGeom>
+          <a:noFill/>
+        </p:spPr>
+        <p:txBody>
+          <a:bodyPr wrap="none" lIns="91440" tIns="45720" rIns="91440" bIns="45720">
+            <a:spAutoFit/>
+          </a:bodyPr>
+          <a:lstStyle/>
+          <a:p>
+            <a:pPr algn="ctr"/>
+            <a:r>
+              <a:rPr lang="en-US" sz="4000" b="0" cap="none" spc="0" dirty="0">
+                <a:ln w="0"/>
+                <a:solidFill>
+                  <a:schemeClr val="tx1"/>
+                </a:solidFill>
+                <a:effectLst>
+                  <a:outerShdw blurRad="38100" dist="19050" dir="2700000" algn="tl" rotWithShape="0">
+                    <a:schemeClr val="dk1">
+                      <a:alpha val="40000"/>
+                    </a:schemeClr>
+                  </a:outerShdw>
+                </a:effectLst>
+              </a:rPr>
+              <a:t>2015</a:t>
+            </a:r>
+          </a:p>
+        </p:txBody>
+      </p:sp>
+      <p:sp>
+        <p:nvSpPr>
+          <p:cNvPr id="13" name="Rectangle 12">
+            <a:extLst>
+              <a:ext uri="{FF2B5EF4-FFF2-40B4-BE49-F238E27FC236}">
+                <a16:creationId xmlns:a16="http://schemas.microsoft.com/office/drawing/2014/main" id="{7C809B36-B524-4550-81CC-B50586617A4E}"/>
+              </a:ext>
+            </a:extLst>
+          </p:cNvPr>
+          <p:cNvSpPr/>
+          <p:nvPr/>
+        </p:nvSpPr>
+        <p:spPr>
+          <a:xfrm>
+            <a:off x="350520" y="366296"/>
+            <a:ext cx="6096000" cy="2308324"/>
+          </a:xfrm>
+          <a:prstGeom prst="rect">
+            <a:avLst/>
+          </a:prstGeom>
+        </p:spPr>
+        <p:txBody>
+          <a:bodyPr>
+            <a:spAutoFit/>
+          </a:bodyPr>
+          <a:lstStyle/>
+          <a:p>
+            <a:pPr marL="285750" indent="-285750">
+              <a:buFont typeface="Arial" panose="020B0604020202020204" pitchFamily="34" charset="0"/>
+              <a:buChar char="•"/>
+            </a:pPr>
+            <a:r>
+              <a:rPr lang="en-US" sz="2400" dirty="0"/>
+              <a:t>Unemployment rate metro area based (~ 600 points) data for 2006, 2009 and 2015</a:t>
+            </a:r>
+          </a:p>
+          <a:p>
+            <a:pPr marL="285750" indent="-285750">
+              <a:buFont typeface="Arial" panose="020B0604020202020204" pitchFamily="34" charset="0"/>
+              <a:buChar char="•"/>
+            </a:pPr>
+            <a:endParaRPr lang="en-US" sz="2400" dirty="0"/>
+          </a:p>
+          <a:p>
+            <a:pPr marL="285750" indent="-285750">
+              <a:buFont typeface="Arial" panose="020B0604020202020204" pitchFamily="34" charset="0"/>
+              <a:buChar char="•"/>
+            </a:pPr>
+            <a:endParaRPr lang="en-US" sz="2400" dirty="0"/>
+          </a:p>
+          <a:p>
+            <a:pPr marL="285750" indent="-285750">
+              <a:buFont typeface="Arial" panose="020B0604020202020204" pitchFamily="34" charset="0"/>
+              <a:buChar char="•"/>
+            </a:pPr>
+            <a:r>
+              <a:rPr lang="en-US" sz="2400" dirty="0"/>
+              <a:t>Blue -&gt; low rate (&lt;= 4%)</a:t>
+            </a:r>
+          </a:p>
+          <a:p>
+            <a:pPr marL="285750" indent="-285750">
+              <a:buFont typeface="Arial" panose="020B0604020202020204" pitchFamily="34" charset="0"/>
+              <a:buChar char="•"/>
+            </a:pPr>
+            <a:r>
+              <a:rPr lang="en-US" sz="2400" dirty="0"/>
+              <a:t>Red -&gt; high rate (&gt;= 8%)</a:t>
+            </a:r>
+          </a:p>
+        </p:txBody>
+      </p:sp>
     </p:spTree>
     <p:extLst>
       <p:ext uri="{BB962C8B-B14F-4D97-AF65-F5344CB8AC3E}">
         <p14:creationId xmlns:p14="http://schemas.microsoft.com/office/powerpoint/2010/main" val="1929226195"/>
+      </p:ext>
+    </p:extLst>
+  </p:cSld>
+  <p:clrMapOvr>
+    <a:masterClrMapping/>
+  </p:clrMapOvr>
+</p:sld>
+</file>
+
+<file path=ppt/slides/slide4.xml><?xml version="1.0" encoding="utf-8"?>
+<p:sld xmlns:a="http://schemas.openxmlformats.org/drawingml/2006/main" xmlns:r="http://schemas.openxmlformats.org/officeDocument/2006/relationships" xmlns:p="http://schemas.openxmlformats.org/presentationml/2006/main">
+  <p:cSld>
+    <p:spTree>
+      <p:nvGrpSpPr>
+        <p:cNvPr id="1" name=""/>
+        <p:cNvGrpSpPr/>
+        <p:nvPr/>
+      </p:nvGrpSpPr>
+      <p:grpSpPr>
+        <a:xfrm>
+          <a:off x="0" y="0"/>
+          <a:ext cx="0" cy="0"/>
+          <a:chOff x="0" y="0"/>
+          <a:chExt cx="0" cy="0"/>
+        </a:xfrm>
+      </p:grpSpPr>
+      <p:pic>
+        <p:nvPicPr>
+          <p:cNvPr id="3" name="Picture 2">
+            <a:extLst>
+              <a:ext uri="{FF2B5EF4-FFF2-40B4-BE49-F238E27FC236}">
+                <a16:creationId xmlns:a16="http://schemas.microsoft.com/office/drawing/2014/main" id="{8998CDA3-3D11-4BCB-9842-7F5B8B033B66}"/>
+              </a:ext>
+            </a:extLst>
+          </p:cNvPr>
+          <p:cNvPicPr>
+            <a:picLocks noChangeAspect="1"/>
+          </p:cNvPicPr>
+          <p:nvPr/>
+        </p:nvPicPr>
+        <p:blipFill>
+          <a:blip r:embed="rId2">
+            <a:extLst>
+              <a:ext uri="{28A0092B-C50C-407E-A947-70E740481C1C}">
+                <a14:useLocalDpi xmlns:a14="http://schemas.microsoft.com/office/drawing/2010/main" val="0"/>
+              </a:ext>
+            </a:extLst>
+          </a:blip>
+          <a:stretch>
+            <a:fillRect/>
+          </a:stretch>
+        </p:blipFill>
+        <p:spPr>
+          <a:xfrm>
+            <a:off x="0" y="2194560"/>
+            <a:ext cx="5598160" cy="4198620"/>
+          </a:xfrm>
+          <a:prstGeom prst="rect">
+            <a:avLst/>
+          </a:prstGeom>
+        </p:spPr>
+      </p:pic>
+      <p:pic>
+        <p:nvPicPr>
+          <p:cNvPr id="5" name="Picture 4">
+            <a:extLst>
+              <a:ext uri="{FF2B5EF4-FFF2-40B4-BE49-F238E27FC236}">
+                <a16:creationId xmlns:a16="http://schemas.microsoft.com/office/drawing/2014/main" id="{9DD7CAC3-0F6F-4329-9F29-2E49C5A16876}"/>
+              </a:ext>
+            </a:extLst>
+          </p:cNvPr>
+          <p:cNvPicPr>
+            <a:picLocks noChangeAspect="1"/>
+          </p:cNvPicPr>
+          <p:nvPr/>
+        </p:nvPicPr>
+        <p:blipFill>
+          <a:blip r:embed="rId3">
+            <a:extLst>
+              <a:ext uri="{28A0092B-C50C-407E-A947-70E740481C1C}">
+                <a14:useLocalDpi xmlns:a14="http://schemas.microsoft.com/office/drawing/2010/main" val="0"/>
+              </a:ext>
+            </a:extLst>
+          </a:blip>
+          <a:stretch>
+            <a:fillRect/>
+          </a:stretch>
+        </p:blipFill>
+        <p:spPr>
+          <a:xfrm>
+            <a:off x="5918200" y="2194560"/>
+            <a:ext cx="5598160" cy="4198620"/>
+          </a:xfrm>
+          <a:prstGeom prst="rect">
+            <a:avLst/>
+          </a:prstGeom>
+        </p:spPr>
+      </p:pic>
+      <p:sp>
+        <p:nvSpPr>
+          <p:cNvPr id="6" name="Rectangle 5">
+            <a:extLst>
+              <a:ext uri="{FF2B5EF4-FFF2-40B4-BE49-F238E27FC236}">
+                <a16:creationId xmlns:a16="http://schemas.microsoft.com/office/drawing/2014/main" id="{D690E59A-D5C7-4D9E-97B4-16990A03782A}"/>
+              </a:ext>
+            </a:extLst>
+          </p:cNvPr>
+          <p:cNvSpPr/>
+          <p:nvPr/>
+        </p:nvSpPr>
+        <p:spPr>
+          <a:xfrm>
+            <a:off x="4007264" y="2721114"/>
+            <a:ext cx="1223412" cy="707886"/>
+          </a:xfrm>
+          <a:prstGeom prst="rect">
+            <a:avLst/>
+          </a:prstGeom>
+          <a:noFill/>
+        </p:spPr>
+        <p:txBody>
+          <a:bodyPr wrap="none" lIns="91440" tIns="45720" rIns="91440" bIns="45720">
+            <a:spAutoFit/>
+          </a:bodyPr>
+          <a:lstStyle/>
+          <a:p>
+            <a:pPr algn="ctr"/>
+            <a:r>
+              <a:rPr lang="en-US" sz="4000" b="0" cap="none" spc="0" dirty="0">
+                <a:ln w="0"/>
+                <a:solidFill>
+                  <a:schemeClr val="tx1"/>
+                </a:solidFill>
+                <a:effectLst>
+                  <a:outerShdw blurRad="38100" dist="19050" dir="2700000" algn="tl" rotWithShape="0">
+                    <a:schemeClr val="dk1">
+                      <a:alpha val="40000"/>
+                    </a:schemeClr>
+                  </a:outerShdw>
+                </a:effectLst>
+              </a:rPr>
+              <a:t>2009</a:t>
+            </a:r>
+          </a:p>
+        </p:txBody>
+      </p:sp>
+      <p:sp>
+        <p:nvSpPr>
+          <p:cNvPr id="7" name="Rectangle 6">
+            <a:extLst>
+              <a:ext uri="{FF2B5EF4-FFF2-40B4-BE49-F238E27FC236}">
+                <a16:creationId xmlns:a16="http://schemas.microsoft.com/office/drawing/2014/main" id="{614CC6FF-9067-418D-9BC7-8ADEC6D4E6CE}"/>
+              </a:ext>
+            </a:extLst>
+          </p:cNvPr>
+          <p:cNvSpPr/>
+          <p:nvPr/>
+        </p:nvSpPr>
+        <p:spPr>
+          <a:xfrm>
+            <a:off x="9804505" y="2721114"/>
+            <a:ext cx="1223412" cy="707886"/>
+          </a:xfrm>
+          <a:prstGeom prst="rect">
+            <a:avLst/>
+          </a:prstGeom>
+          <a:noFill/>
+        </p:spPr>
+        <p:txBody>
+          <a:bodyPr wrap="none" lIns="91440" tIns="45720" rIns="91440" bIns="45720">
+            <a:spAutoFit/>
+          </a:bodyPr>
+          <a:lstStyle/>
+          <a:p>
+            <a:pPr algn="ctr"/>
+            <a:r>
+              <a:rPr lang="en-US" sz="4000" b="0" cap="none" spc="0" dirty="0">
+                <a:ln w="0"/>
+                <a:solidFill>
+                  <a:schemeClr val="tx1"/>
+                </a:solidFill>
+                <a:effectLst>
+                  <a:outerShdw blurRad="38100" dist="19050" dir="2700000" algn="tl" rotWithShape="0">
+                    <a:schemeClr val="dk1">
+                      <a:alpha val="40000"/>
+                    </a:schemeClr>
+                  </a:outerShdw>
+                </a:effectLst>
+              </a:rPr>
+              <a:t>2015</a:t>
+            </a:r>
+          </a:p>
+        </p:txBody>
+      </p:sp>
+      <p:sp>
+        <p:nvSpPr>
+          <p:cNvPr id="8" name="Rectangle 7">
+            <a:extLst>
+              <a:ext uri="{FF2B5EF4-FFF2-40B4-BE49-F238E27FC236}">
+                <a16:creationId xmlns:a16="http://schemas.microsoft.com/office/drawing/2014/main" id="{A2805DA3-ECF6-4139-BA70-3024C8C138FC}"/>
+              </a:ext>
+            </a:extLst>
+          </p:cNvPr>
+          <p:cNvSpPr/>
+          <p:nvPr/>
+        </p:nvSpPr>
+        <p:spPr>
+          <a:xfrm>
+            <a:off x="563880" y="361623"/>
+            <a:ext cx="7787640" cy="1569660"/>
+          </a:xfrm>
+          <a:prstGeom prst="rect">
+            <a:avLst/>
+          </a:prstGeom>
+        </p:spPr>
+        <p:txBody>
+          <a:bodyPr wrap="square">
+            <a:spAutoFit/>
+          </a:bodyPr>
+          <a:lstStyle/>
+          <a:p>
+            <a:pPr marL="285750" indent="-285750">
+              <a:buFont typeface="Arial" panose="020B0604020202020204" pitchFamily="34" charset="0"/>
+              <a:buChar char="•"/>
+            </a:pPr>
+            <a:r>
+              <a:rPr lang="en-US" sz="2400" dirty="0"/>
+              <a:t>GDP data metro area based (~ 500 points) </a:t>
+            </a:r>
+          </a:p>
+          <a:p>
+            <a:endParaRPr lang="en-US" sz="2400" dirty="0"/>
+          </a:p>
+          <a:p>
+            <a:pPr marL="285750" indent="-285750">
+              <a:buFont typeface="Arial" panose="020B0604020202020204" pitchFamily="34" charset="0"/>
+              <a:buChar char="•"/>
+            </a:pPr>
+            <a:r>
+              <a:rPr lang="en-US" sz="2400" dirty="0"/>
+              <a:t>Blue -&gt; low GDP (&lt;= 1800)</a:t>
+            </a:r>
+          </a:p>
+          <a:p>
+            <a:pPr marL="285750" indent="-285750">
+              <a:buFont typeface="Arial" panose="020B0604020202020204" pitchFamily="34" charset="0"/>
+              <a:buChar char="•"/>
+            </a:pPr>
+            <a:r>
+              <a:rPr lang="en-US" sz="2400" dirty="0"/>
+              <a:t>Red -&gt; high GDP (&gt;= 50000)</a:t>
+            </a:r>
+          </a:p>
+        </p:txBody>
+      </p:sp>
+    </p:spTree>
+    <p:extLst>
+      <p:ext uri="{BB962C8B-B14F-4D97-AF65-F5344CB8AC3E}">
+        <p14:creationId xmlns:p14="http://schemas.microsoft.com/office/powerpoint/2010/main" val="1666287241"/>
+      </p:ext>
+    </p:extLst>
+  </p:cSld>
+  <p:clrMapOvr>
+    <a:masterClrMapping/>
+  </p:clrMapOvr>
+</p:sld>
+</file>
+
+<file path=ppt/slides/slide5.xml><?xml version="1.0" encoding="utf-8"?>
+<p:sld xmlns:a="http://schemas.openxmlformats.org/drawingml/2006/main" xmlns:r="http://schemas.openxmlformats.org/officeDocument/2006/relationships" xmlns:p="http://schemas.openxmlformats.org/presentationml/2006/main">
+  <p:cSld>
+    <p:spTree>
+      <p:nvGrpSpPr>
+        <p:cNvPr id="1" name=""/>
+        <p:cNvGrpSpPr/>
+        <p:nvPr/>
+      </p:nvGrpSpPr>
+      <p:grpSpPr>
+        <a:xfrm>
+          <a:off x="0" y="0"/>
+          <a:ext cx="0" cy="0"/>
+          <a:chOff x="0" y="0"/>
+          <a:chExt cx="0" cy="0"/>
+        </a:xfrm>
+      </p:grpSpPr>
+      <p:pic>
+        <p:nvPicPr>
+          <p:cNvPr id="3" name="Picture 2">
+            <a:extLst>
+              <a:ext uri="{FF2B5EF4-FFF2-40B4-BE49-F238E27FC236}">
+                <a16:creationId xmlns:a16="http://schemas.microsoft.com/office/drawing/2014/main" id="{869E58E4-28BA-43AD-B31E-361DCAF0D764}"/>
+              </a:ext>
+            </a:extLst>
+          </p:cNvPr>
+          <p:cNvPicPr>
+            <a:picLocks noChangeAspect="1"/>
+          </p:cNvPicPr>
+          <p:nvPr/>
+        </p:nvPicPr>
+        <p:blipFill>
+          <a:blip r:embed="rId2">
+            <a:extLst>
+              <a:ext uri="{28A0092B-C50C-407E-A947-70E740481C1C}">
+                <a14:useLocalDpi xmlns:a14="http://schemas.microsoft.com/office/drawing/2010/main" val="0"/>
+              </a:ext>
+            </a:extLst>
+          </a:blip>
+          <a:stretch>
+            <a:fillRect/>
+          </a:stretch>
+        </p:blipFill>
+        <p:spPr>
+          <a:xfrm>
+            <a:off x="60960" y="2217420"/>
+            <a:ext cx="6085840" cy="4564380"/>
+          </a:xfrm>
+          <a:prstGeom prst="rect">
+            <a:avLst/>
+          </a:prstGeom>
+        </p:spPr>
+      </p:pic>
+      <p:pic>
+        <p:nvPicPr>
+          <p:cNvPr id="5" name="Picture 4">
+            <a:extLst>
+              <a:ext uri="{FF2B5EF4-FFF2-40B4-BE49-F238E27FC236}">
+                <a16:creationId xmlns:a16="http://schemas.microsoft.com/office/drawing/2014/main" id="{059F86B1-20D7-4D39-A131-EA73E8C54D11}"/>
+              </a:ext>
+            </a:extLst>
+          </p:cNvPr>
+          <p:cNvPicPr>
+            <a:picLocks noChangeAspect="1"/>
+          </p:cNvPicPr>
+          <p:nvPr/>
+        </p:nvPicPr>
+        <p:blipFill>
+          <a:blip r:embed="rId3">
+            <a:extLst>
+              <a:ext uri="{28A0092B-C50C-407E-A947-70E740481C1C}">
+                <a14:useLocalDpi xmlns:a14="http://schemas.microsoft.com/office/drawing/2010/main" val="0"/>
+              </a:ext>
+            </a:extLst>
+          </a:blip>
+          <a:stretch>
+            <a:fillRect/>
+          </a:stretch>
+        </p:blipFill>
+        <p:spPr>
+          <a:xfrm>
+            <a:off x="5984240" y="2232660"/>
+            <a:ext cx="6085840" cy="4564380"/>
+          </a:xfrm>
+          <a:prstGeom prst="rect">
+            <a:avLst/>
+          </a:prstGeom>
+        </p:spPr>
+      </p:pic>
+      <p:sp>
+        <p:nvSpPr>
+          <p:cNvPr id="6" name="Rectangle 5">
+            <a:extLst>
+              <a:ext uri="{FF2B5EF4-FFF2-40B4-BE49-F238E27FC236}">
+                <a16:creationId xmlns:a16="http://schemas.microsoft.com/office/drawing/2014/main" id="{C5B19172-1AB7-406B-9BF6-F7E88A41207F}"/>
+              </a:ext>
+            </a:extLst>
+          </p:cNvPr>
+          <p:cNvSpPr/>
+          <p:nvPr/>
+        </p:nvSpPr>
+        <p:spPr>
+          <a:xfrm>
+            <a:off x="4007264" y="2721114"/>
+            <a:ext cx="1223412" cy="707886"/>
+          </a:xfrm>
+          <a:prstGeom prst="rect">
+            <a:avLst/>
+          </a:prstGeom>
+          <a:noFill/>
+        </p:spPr>
+        <p:txBody>
+          <a:bodyPr wrap="none" lIns="91440" tIns="45720" rIns="91440" bIns="45720">
+            <a:spAutoFit/>
+          </a:bodyPr>
+          <a:lstStyle/>
+          <a:p>
+            <a:pPr algn="ctr"/>
+            <a:r>
+              <a:rPr lang="en-US" sz="4000" b="0" cap="none" spc="0" dirty="0">
+                <a:ln w="0"/>
+                <a:solidFill>
+                  <a:schemeClr val="tx1"/>
+                </a:solidFill>
+                <a:effectLst>
+                  <a:outerShdw blurRad="38100" dist="19050" dir="2700000" algn="tl" rotWithShape="0">
+                    <a:schemeClr val="dk1">
+                      <a:alpha val="40000"/>
+                    </a:schemeClr>
+                  </a:outerShdw>
+                </a:effectLst>
+              </a:rPr>
+              <a:t>2009</a:t>
+            </a:r>
+          </a:p>
+        </p:txBody>
+      </p:sp>
+      <p:sp>
+        <p:nvSpPr>
+          <p:cNvPr id="7" name="Rectangle 6">
+            <a:extLst>
+              <a:ext uri="{FF2B5EF4-FFF2-40B4-BE49-F238E27FC236}">
+                <a16:creationId xmlns:a16="http://schemas.microsoft.com/office/drawing/2014/main" id="{3D0F60AC-46DA-4833-8A4A-D813EF5BAB60}"/>
+              </a:ext>
+            </a:extLst>
+          </p:cNvPr>
+          <p:cNvSpPr/>
+          <p:nvPr/>
+        </p:nvSpPr>
+        <p:spPr>
+          <a:xfrm>
+            <a:off x="9804505" y="2721114"/>
+            <a:ext cx="1223412" cy="707886"/>
+          </a:xfrm>
+          <a:prstGeom prst="rect">
+            <a:avLst/>
+          </a:prstGeom>
+          <a:noFill/>
+        </p:spPr>
+        <p:txBody>
+          <a:bodyPr wrap="none" lIns="91440" tIns="45720" rIns="91440" bIns="45720">
+            <a:spAutoFit/>
+          </a:bodyPr>
+          <a:lstStyle/>
+          <a:p>
+            <a:pPr algn="ctr"/>
+            <a:r>
+              <a:rPr lang="en-US" sz="4000" b="0" cap="none" spc="0" dirty="0">
+                <a:ln w="0"/>
+                <a:solidFill>
+                  <a:schemeClr val="tx1"/>
+                </a:solidFill>
+                <a:effectLst>
+                  <a:outerShdw blurRad="38100" dist="19050" dir="2700000" algn="tl" rotWithShape="0">
+                    <a:schemeClr val="dk1">
+                      <a:alpha val="40000"/>
+                    </a:schemeClr>
+                  </a:outerShdw>
+                </a:effectLst>
+              </a:rPr>
+              <a:t>2015</a:t>
+            </a:r>
+          </a:p>
+        </p:txBody>
+      </p:sp>
+      <p:sp>
+        <p:nvSpPr>
+          <p:cNvPr id="8" name="Rectangle 7">
+            <a:extLst>
+              <a:ext uri="{FF2B5EF4-FFF2-40B4-BE49-F238E27FC236}">
+                <a16:creationId xmlns:a16="http://schemas.microsoft.com/office/drawing/2014/main" id="{553F1A9A-8DBE-4201-96B9-FE60BCB1EADC}"/>
+              </a:ext>
+            </a:extLst>
+          </p:cNvPr>
+          <p:cNvSpPr/>
+          <p:nvPr/>
+        </p:nvSpPr>
+        <p:spPr>
+          <a:xfrm>
+            <a:off x="563880" y="361623"/>
+            <a:ext cx="7787640" cy="1569660"/>
+          </a:xfrm>
+          <a:prstGeom prst="rect">
+            <a:avLst/>
+          </a:prstGeom>
+        </p:spPr>
+        <p:txBody>
+          <a:bodyPr wrap="square">
+            <a:spAutoFit/>
+          </a:bodyPr>
+          <a:lstStyle/>
+          <a:p>
+            <a:pPr marL="285750" indent="-285750">
+              <a:buFont typeface="Arial" panose="020B0604020202020204" pitchFamily="34" charset="0"/>
+              <a:buChar char="•"/>
+            </a:pPr>
+            <a:r>
+              <a:rPr lang="en-US" sz="2400" dirty="0"/>
+              <a:t>Personal income data metro area based (~ 500 points) </a:t>
+            </a:r>
+          </a:p>
+          <a:p>
+            <a:endParaRPr lang="en-US" sz="2400" dirty="0"/>
+          </a:p>
+          <a:p>
+            <a:pPr marL="285750" indent="-285750">
+              <a:buFont typeface="Arial" panose="020B0604020202020204" pitchFamily="34" charset="0"/>
+              <a:buChar char="•"/>
+            </a:pPr>
+            <a:r>
+              <a:rPr lang="en-US" sz="2400" dirty="0"/>
+              <a:t>Blue -&gt; low income (&lt;= 12000)</a:t>
+            </a:r>
+          </a:p>
+          <a:p>
+            <a:pPr marL="285750" indent="-285750">
+              <a:buFont typeface="Arial" panose="020B0604020202020204" pitchFamily="34" charset="0"/>
+              <a:buChar char="•"/>
+            </a:pPr>
+            <a:r>
+              <a:rPr lang="en-US" sz="2400" dirty="0"/>
+              <a:t>Red -&gt; high income (&gt;= 68000)</a:t>
+            </a:r>
+          </a:p>
+        </p:txBody>
+      </p:sp>
+    </p:spTree>
+    <p:extLst>
+      <p:ext uri="{BB962C8B-B14F-4D97-AF65-F5344CB8AC3E}">
+        <p14:creationId xmlns:p14="http://schemas.microsoft.com/office/powerpoint/2010/main" val="2547456963"/>
+      </p:ext>
+    </p:extLst>
+  </p:cSld>
+  <p:clrMapOvr>
+    <a:masterClrMapping/>
+  </p:clrMapOvr>
+</p:sld>
+</file>
+
+<file path=ppt/slides/slide6.xml><?xml version="1.0" encoding="utf-8"?>
+<p:sld xmlns:a="http://schemas.openxmlformats.org/drawingml/2006/main" xmlns:r="http://schemas.openxmlformats.org/officeDocument/2006/relationships" xmlns:p="http://schemas.openxmlformats.org/presentationml/2006/main">
+  <p:cSld>
+    <p:spTree>
+      <p:nvGrpSpPr>
+        <p:cNvPr id="1" name=""/>
+        <p:cNvGrpSpPr/>
+        <p:nvPr/>
+      </p:nvGrpSpPr>
+      <p:grpSpPr>
+        <a:xfrm>
+          <a:off x="0" y="0"/>
+          <a:ext cx="0" cy="0"/>
+          <a:chOff x="0" y="0"/>
+          <a:chExt cx="0" cy="0"/>
+        </a:xfrm>
+      </p:grpSpPr>
+      <p:sp>
+        <p:nvSpPr>
+          <p:cNvPr id="2" name="TextBox 1">
+            <a:extLst>
+              <a:ext uri="{FF2B5EF4-FFF2-40B4-BE49-F238E27FC236}">
+                <a16:creationId xmlns:a16="http://schemas.microsoft.com/office/drawing/2014/main" id="{E79715A3-ACB5-4FAE-9FE9-B14B193A5114}"/>
+              </a:ext>
+            </a:extLst>
+          </p:cNvPr>
+          <p:cNvSpPr txBox="1"/>
+          <p:nvPr/>
+        </p:nvSpPr>
+        <p:spPr>
+          <a:xfrm>
+            <a:off x="249382" y="249382"/>
+            <a:ext cx="2909454" cy="4247317"/>
+          </a:xfrm>
+          <a:prstGeom prst="rect">
+            <a:avLst/>
+          </a:prstGeom>
+          <a:noFill/>
+        </p:spPr>
+        <p:txBody>
+          <a:bodyPr wrap="square" rtlCol="0">
+            <a:spAutoFit/>
+          </a:bodyPr>
+          <a:lstStyle/>
+          <a:p>
+            <a:r>
+              <a:rPr lang="en-US" dirty="0"/>
+              <a:t>Final data set sample:</a:t>
+            </a:r>
+          </a:p>
+          <a:p>
+            <a:endParaRPr lang="en-US" dirty="0"/>
+          </a:p>
+          <a:p>
+            <a:endParaRPr lang="en-US" dirty="0"/>
+          </a:p>
+          <a:p>
+            <a:endParaRPr lang="en-US" dirty="0"/>
+          </a:p>
+          <a:p>
+            <a:endParaRPr lang="en-US" dirty="0"/>
+          </a:p>
+          <a:p>
+            <a:endParaRPr lang="en-US" dirty="0"/>
+          </a:p>
+          <a:p>
+            <a:endParaRPr lang="en-US" dirty="0"/>
+          </a:p>
+          <a:p>
+            <a:endParaRPr lang="en-US" dirty="0"/>
+          </a:p>
+          <a:p>
+            <a:endParaRPr lang="en-US" dirty="0"/>
+          </a:p>
+          <a:p>
+            <a:endParaRPr lang="en-US" dirty="0"/>
+          </a:p>
+          <a:p>
+            <a:endParaRPr lang="en-US" dirty="0"/>
+          </a:p>
+          <a:p>
+            <a:endParaRPr lang="en-US" dirty="0"/>
+          </a:p>
+          <a:p>
+            <a:endParaRPr lang="en-US" dirty="0"/>
+          </a:p>
+          <a:p>
+            <a:endParaRPr lang="en-US" dirty="0"/>
+          </a:p>
+          <a:p>
+            <a:endParaRPr lang="en-US" dirty="0"/>
+          </a:p>
+        </p:txBody>
+      </p:sp>
+      <p:pic>
+        <p:nvPicPr>
+          <p:cNvPr id="4" name="Picture 3">
+            <a:extLst>
+              <a:ext uri="{FF2B5EF4-FFF2-40B4-BE49-F238E27FC236}">
+                <a16:creationId xmlns:a16="http://schemas.microsoft.com/office/drawing/2014/main" id="{1D87129E-45D3-4871-878F-801E6EF75AD7}"/>
+              </a:ext>
+            </a:extLst>
+          </p:cNvPr>
+          <p:cNvPicPr>
+            <a:picLocks noChangeAspect="1"/>
+          </p:cNvPicPr>
+          <p:nvPr/>
+        </p:nvPicPr>
+        <p:blipFill>
+          <a:blip r:embed="rId2"/>
+          <a:stretch>
+            <a:fillRect/>
+          </a:stretch>
+        </p:blipFill>
+        <p:spPr>
+          <a:xfrm>
+            <a:off x="249382" y="1020634"/>
+            <a:ext cx="10665060" cy="4442015"/>
+          </a:xfrm>
+          <a:prstGeom prst="rect">
+            <a:avLst/>
+          </a:prstGeom>
+        </p:spPr>
+      </p:pic>
+    </p:spTree>
+    <p:extLst>
+      <p:ext uri="{BB962C8B-B14F-4D97-AF65-F5344CB8AC3E}">
+        <p14:creationId xmlns:p14="http://schemas.microsoft.com/office/powerpoint/2010/main" val="2410981576"/>
+      </p:ext>
+    </p:extLst>
+  </p:cSld>
+  <p:clrMapOvr>
+    <a:masterClrMapping/>
+  </p:clrMapOvr>
+</p:sld>
+</file>
+
+<file path=ppt/slides/slide7.xml><?xml version="1.0" encoding="utf-8"?>
+<p:sld xmlns:a="http://schemas.openxmlformats.org/drawingml/2006/main" xmlns:r="http://schemas.openxmlformats.org/officeDocument/2006/relationships" xmlns:p="http://schemas.openxmlformats.org/presentationml/2006/main">
+  <p:cSld>
+    <p:spTree>
+      <p:nvGrpSpPr>
+        <p:cNvPr id="1" name=""/>
+        <p:cNvGrpSpPr/>
+        <p:nvPr/>
+      </p:nvGrpSpPr>
+      <p:grpSpPr>
+        <a:xfrm>
+          <a:off x="0" y="0"/>
+          <a:ext cx="0" cy="0"/>
+          <a:chOff x="0" y="0"/>
+          <a:chExt cx="0" cy="0"/>
+        </a:xfrm>
+      </p:grpSpPr>
+      <p:pic>
+        <p:nvPicPr>
+          <p:cNvPr id="3" name="Picture 2">
+            <a:extLst>
+              <a:ext uri="{FF2B5EF4-FFF2-40B4-BE49-F238E27FC236}">
+                <a16:creationId xmlns:a16="http://schemas.microsoft.com/office/drawing/2014/main" id="{46C1873E-53FC-4191-B39F-D4C672C43F44}"/>
+              </a:ext>
+            </a:extLst>
+          </p:cNvPr>
+          <p:cNvPicPr>
+            <a:picLocks noChangeAspect="1"/>
+          </p:cNvPicPr>
+          <p:nvPr/>
+        </p:nvPicPr>
+        <p:blipFill>
+          <a:blip r:embed="rId2"/>
+          <a:stretch>
+            <a:fillRect/>
+          </a:stretch>
+        </p:blipFill>
+        <p:spPr>
+          <a:xfrm>
+            <a:off x="129700" y="162665"/>
+            <a:ext cx="7519613" cy="3100079"/>
+          </a:xfrm>
+          <a:prstGeom prst="rect">
+            <a:avLst/>
+          </a:prstGeom>
+        </p:spPr>
+      </p:pic>
+    </p:spTree>
+    <p:extLst>
+      <p:ext uri="{BB962C8B-B14F-4D97-AF65-F5344CB8AC3E}">
+        <p14:creationId xmlns:p14="http://schemas.microsoft.com/office/powerpoint/2010/main" val="2647624405"/>
       </p:ext>
     </p:extLst>
   </p:cSld>

</xml_diff>